<commit_message>
updating pptx with data analysis
</commit_message>
<xml_diff>
--- a/presentation.pptx
+++ b/presentation.pptx
@@ -8,6 +8,16 @@
     <p:sldId id="256" r:id="rId2"/>
     <p:sldId id="257" r:id="rId3"/>
     <p:sldId id="258" r:id="rId4"/>
+    <p:sldId id="259" r:id="rId5"/>
+    <p:sldId id="263" r:id="rId6"/>
+    <p:sldId id="261" r:id="rId7"/>
+    <p:sldId id="262" r:id="rId8"/>
+    <p:sldId id="260" r:id="rId9"/>
+    <p:sldId id="264" r:id="rId10"/>
+    <p:sldId id="265" r:id="rId11"/>
+    <p:sldId id="266" r:id="rId12"/>
+    <p:sldId id="267" r:id="rId13"/>
+    <p:sldId id="268" r:id="rId14"/>
   </p:sldIdLst>
   <p:sldSz cx="12192000" cy="6858000"/>
   <p:notesSz cx="6858000" cy="9144000"/>
@@ -106,6 +116,11 @@
       </a:defRPr>
     </a:lvl9pPr>
   </p:defaultTextStyle>
+  <p:extLst>
+    <p:ext uri="{EFAFB233-063F-42B5-8137-9DF3F51BA10A}">
+      <p15:sldGuideLst xmlns:p15="http://schemas.microsoft.com/office/powerpoint/2012/main"/>
+    </p:ext>
+  </p:extLst>
 </p:presentation>
 </file>
 
@@ -295,7 +310,7 @@
           <a:p>
             <a:fld id="{44332F1C-FDE6-4B22-BAB3-7B6D3DF3ED00}" type="datetimeFigureOut">
               <a:rPr lang="en-GB" smtClean="0"/>
-              <a:t>31/12/2019</a:t>
+              <a:t>01/02/2020</a:t>
             </a:fld>
             <a:endParaRPr lang="en-GB"/>
           </a:p>
@@ -337,7 +352,7 @@
           <a:p>
             <a:fld id="{C3BA7A23-F483-4D48-93AE-994D00473EAF}" type="slidenum">
               <a:rPr lang="en-GB" smtClean="0"/>
-              <a:t>‹N°›</a:t>
+              <a:t>‹#›</a:t>
             </a:fld>
             <a:endParaRPr lang="en-GB"/>
           </a:p>
@@ -570,7 +585,7 @@
           <a:p>
             <a:fld id="{44332F1C-FDE6-4B22-BAB3-7B6D3DF3ED00}" type="datetimeFigureOut">
               <a:rPr lang="en-GB" smtClean="0"/>
-              <a:t>31/12/2019</a:t>
+              <a:t>01/02/2020</a:t>
             </a:fld>
             <a:endParaRPr lang="en-GB"/>
           </a:p>
@@ -612,7 +627,7 @@
           <a:p>
             <a:fld id="{C3BA7A23-F483-4D48-93AE-994D00473EAF}" type="slidenum">
               <a:rPr lang="en-GB" smtClean="0"/>
-              <a:t>‹N°›</a:t>
+              <a:t>‹#›</a:t>
             </a:fld>
             <a:endParaRPr lang="en-GB"/>
           </a:p>
@@ -764,7 +779,7 @@
           <a:p>
             <a:fld id="{44332F1C-FDE6-4B22-BAB3-7B6D3DF3ED00}" type="datetimeFigureOut">
               <a:rPr lang="en-GB" smtClean="0"/>
-              <a:t>31/12/2019</a:t>
+              <a:t>01/02/2020</a:t>
             </a:fld>
             <a:endParaRPr lang="en-GB"/>
           </a:p>
@@ -806,7 +821,7 @@
           <a:p>
             <a:fld id="{C3BA7A23-F483-4D48-93AE-994D00473EAF}" type="slidenum">
               <a:rPr lang="en-GB" smtClean="0"/>
-              <a:t>‹N°›</a:t>
+              <a:t>‹#›</a:t>
             </a:fld>
             <a:endParaRPr lang="en-GB"/>
           </a:p>
@@ -1037,7 +1052,7 @@
           <a:p>
             <a:fld id="{44332F1C-FDE6-4B22-BAB3-7B6D3DF3ED00}" type="datetimeFigureOut">
               <a:rPr lang="en-GB" smtClean="0"/>
-              <a:t>31/12/2019</a:t>
+              <a:t>01/02/2020</a:t>
             </a:fld>
             <a:endParaRPr lang="en-GB"/>
           </a:p>
@@ -1079,7 +1094,7 @@
           <a:p>
             <a:fld id="{C3BA7A23-F483-4D48-93AE-994D00473EAF}" type="slidenum">
               <a:rPr lang="en-GB" smtClean="0"/>
-              <a:t>‹N°›</a:t>
+              <a:t>‹#›</a:t>
             </a:fld>
             <a:endParaRPr lang="en-GB"/>
           </a:p>
@@ -1378,7 +1393,7 @@
           <a:p>
             <a:fld id="{44332F1C-FDE6-4B22-BAB3-7B6D3DF3ED00}" type="datetimeFigureOut">
               <a:rPr lang="en-GB" smtClean="0"/>
-              <a:t>31/12/2019</a:t>
+              <a:t>01/02/2020</a:t>
             </a:fld>
             <a:endParaRPr lang="en-GB"/>
           </a:p>
@@ -1420,7 +1435,7 @@
           <a:p>
             <a:fld id="{C3BA7A23-F483-4D48-93AE-994D00473EAF}" type="slidenum">
               <a:rPr lang="en-GB" smtClean="0"/>
-              <a:t>‹N°›</a:t>
+              <a:t>‹#›</a:t>
             </a:fld>
             <a:endParaRPr lang="en-GB"/>
           </a:p>
@@ -2001,7 +2016,7 @@
           <a:p>
             <a:fld id="{44332F1C-FDE6-4B22-BAB3-7B6D3DF3ED00}" type="datetimeFigureOut">
               <a:rPr lang="en-GB" smtClean="0"/>
-              <a:t>31/12/2019</a:t>
+              <a:t>01/02/2020</a:t>
             </a:fld>
             <a:endParaRPr lang="en-GB"/>
           </a:p>
@@ -2043,7 +2058,7 @@
           <a:p>
             <a:fld id="{C3BA7A23-F483-4D48-93AE-994D00473EAF}" type="slidenum">
               <a:rPr lang="en-GB" smtClean="0"/>
-              <a:t>‹N°›</a:t>
+              <a:t>‹#›</a:t>
             </a:fld>
             <a:endParaRPr lang="en-GB"/>
           </a:p>
@@ -2861,7 +2876,7 @@
           <a:p>
             <a:fld id="{44332F1C-FDE6-4B22-BAB3-7B6D3DF3ED00}" type="datetimeFigureOut">
               <a:rPr lang="en-GB" smtClean="0"/>
-              <a:t>31/12/2019</a:t>
+              <a:t>01/02/2020</a:t>
             </a:fld>
             <a:endParaRPr lang="en-GB"/>
           </a:p>
@@ -2903,7 +2918,7 @@
           <a:p>
             <a:fld id="{C3BA7A23-F483-4D48-93AE-994D00473EAF}" type="slidenum">
               <a:rPr lang="en-GB" smtClean="0"/>
-              <a:t>‹N°›</a:t>
+              <a:t>‹#›</a:t>
             </a:fld>
             <a:endParaRPr lang="en-GB"/>
           </a:p>
@@ -3031,7 +3046,7 @@
           <a:p>
             <a:fld id="{44332F1C-FDE6-4B22-BAB3-7B6D3DF3ED00}" type="datetimeFigureOut">
               <a:rPr lang="en-GB" smtClean="0"/>
-              <a:t>31/12/2019</a:t>
+              <a:t>01/02/2020</a:t>
             </a:fld>
             <a:endParaRPr lang="en-GB"/>
           </a:p>
@@ -3073,7 +3088,7 @@
           <a:p>
             <a:fld id="{C3BA7A23-F483-4D48-93AE-994D00473EAF}" type="slidenum">
               <a:rPr lang="en-GB" smtClean="0"/>
-              <a:t>‹N°›</a:t>
+              <a:t>‹#›</a:t>
             </a:fld>
             <a:endParaRPr lang="en-GB"/>
           </a:p>
@@ -3211,7 +3226,7 @@
           <a:p>
             <a:fld id="{44332F1C-FDE6-4B22-BAB3-7B6D3DF3ED00}" type="datetimeFigureOut">
               <a:rPr lang="en-GB" smtClean="0"/>
-              <a:t>31/12/2019</a:t>
+              <a:t>01/02/2020</a:t>
             </a:fld>
             <a:endParaRPr lang="en-GB"/>
           </a:p>
@@ -3253,7 +3268,7 @@
           <a:p>
             <a:fld id="{C3BA7A23-F483-4D48-93AE-994D00473EAF}" type="slidenum">
               <a:rPr lang="en-GB" smtClean="0"/>
-              <a:t>‹N°›</a:t>
+              <a:t>‹#›</a:t>
             </a:fld>
             <a:endParaRPr lang="en-GB"/>
           </a:p>
@@ -3381,7 +3396,7 @@
           <a:p>
             <a:fld id="{44332F1C-FDE6-4B22-BAB3-7B6D3DF3ED00}" type="datetimeFigureOut">
               <a:rPr lang="en-GB" smtClean="0"/>
-              <a:t>31/12/2019</a:t>
+              <a:t>01/02/2020</a:t>
             </a:fld>
             <a:endParaRPr lang="en-GB"/>
           </a:p>
@@ -3423,7 +3438,7 @@
           <a:p>
             <a:fld id="{C3BA7A23-F483-4D48-93AE-994D00473EAF}" type="slidenum">
               <a:rPr lang="en-GB" smtClean="0"/>
-              <a:t>‹N°›</a:t>
+              <a:t>‹#›</a:t>
             </a:fld>
             <a:endParaRPr lang="en-GB"/>
           </a:p>
@@ -3628,7 +3643,7 @@
           <a:p>
             <a:fld id="{44332F1C-FDE6-4B22-BAB3-7B6D3DF3ED00}" type="datetimeFigureOut">
               <a:rPr lang="en-GB" smtClean="0"/>
-              <a:t>31/12/2019</a:t>
+              <a:t>01/02/2020</a:t>
             </a:fld>
             <a:endParaRPr lang="en-GB"/>
           </a:p>
@@ -3670,7 +3685,7 @@
           <a:p>
             <a:fld id="{C3BA7A23-F483-4D48-93AE-994D00473EAF}" type="slidenum">
               <a:rPr lang="en-GB" smtClean="0"/>
-              <a:t>‹N°›</a:t>
+              <a:t>‹#›</a:t>
             </a:fld>
             <a:endParaRPr lang="en-GB"/>
           </a:p>
@@ -3920,7 +3935,7 @@
           <a:p>
             <a:fld id="{44332F1C-FDE6-4B22-BAB3-7B6D3DF3ED00}" type="datetimeFigureOut">
               <a:rPr lang="en-GB" smtClean="0"/>
-              <a:t>31/12/2019</a:t>
+              <a:t>01/02/2020</a:t>
             </a:fld>
             <a:endParaRPr lang="en-GB"/>
           </a:p>
@@ -3962,7 +3977,7 @@
           <a:p>
             <a:fld id="{C3BA7A23-F483-4D48-93AE-994D00473EAF}" type="slidenum">
               <a:rPr lang="en-GB" smtClean="0"/>
-              <a:t>‹N°›</a:t>
+              <a:t>‹#›</a:t>
             </a:fld>
             <a:endParaRPr lang="en-GB"/>
           </a:p>
@@ -4364,7 +4379,7 @@
           <a:p>
             <a:fld id="{44332F1C-FDE6-4B22-BAB3-7B6D3DF3ED00}" type="datetimeFigureOut">
               <a:rPr lang="en-GB" smtClean="0"/>
-              <a:t>31/12/2019</a:t>
+              <a:t>01/02/2020</a:t>
             </a:fld>
             <a:endParaRPr lang="en-GB"/>
           </a:p>
@@ -4406,7 +4421,7 @@
           <a:p>
             <a:fld id="{C3BA7A23-F483-4D48-93AE-994D00473EAF}" type="slidenum">
               <a:rPr lang="en-GB" smtClean="0"/>
-              <a:t>‹N°›</a:t>
+              <a:t>‹#›</a:t>
             </a:fld>
             <a:endParaRPr lang="en-GB"/>
           </a:p>
@@ -4482,7 +4497,7 @@
           <a:p>
             <a:fld id="{44332F1C-FDE6-4B22-BAB3-7B6D3DF3ED00}" type="datetimeFigureOut">
               <a:rPr lang="en-GB" smtClean="0"/>
-              <a:t>31/12/2019</a:t>
+              <a:t>01/02/2020</a:t>
             </a:fld>
             <a:endParaRPr lang="en-GB"/>
           </a:p>
@@ -4524,7 +4539,7 @@
           <a:p>
             <a:fld id="{C3BA7A23-F483-4D48-93AE-994D00473EAF}" type="slidenum">
               <a:rPr lang="en-GB" smtClean="0"/>
-              <a:t>‹N°›</a:t>
+              <a:t>‹#›</a:t>
             </a:fld>
             <a:endParaRPr lang="en-GB"/>
           </a:p>
@@ -4577,7 +4592,7 @@
           <a:p>
             <a:fld id="{44332F1C-FDE6-4B22-BAB3-7B6D3DF3ED00}" type="datetimeFigureOut">
               <a:rPr lang="en-GB" smtClean="0"/>
-              <a:t>31/12/2019</a:t>
+              <a:t>01/02/2020</a:t>
             </a:fld>
             <a:endParaRPr lang="en-GB"/>
           </a:p>
@@ -4619,7 +4634,7 @@
           <a:p>
             <a:fld id="{C3BA7A23-F483-4D48-93AE-994D00473EAF}" type="slidenum">
               <a:rPr lang="en-GB" smtClean="0"/>
-              <a:t>‹N°›</a:t>
+              <a:t>‹#›</a:t>
             </a:fld>
             <a:endParaRPr lang="en-GB"/>
           </a:p>
@@ -4856,7 +4871,7 @@
           <a:p>
             <a:fld id="{44332F1C-FDE6-4B22-BAB3-7B6D3DF3ED00}" type="datetimeFigureOut">
               <a:rPr lang="en-GB" smtClean="0"/>
-              <a:t>31/12/2019</a:t>
+              <a:t>01/02/2020</a:t>
             </a:fld>
             <a:endParaRPr lang="en-GB"/>
           </a:p>
@@ -4898,7 +4913,7 @@
           <a:p>
             <a:fld id="{C3BA7A23-F483-4D48-93AE-994D00473EAF}" type="slidenum">
               <a:rPr lang="en-GB" smtClean="0"/>
-              <a:t>‹N°›</a:t>
+              <a:t>‹#›</a:t>
             </a:fld>
             <a:endParaRPr lang="en-GB"/>
           </a:p>
@@ -5131,7 +5146,7 @@
           <a:p>
             <a:fld id="{44332F1C-FDE6-4B22-BAB3-7B6D3DF3ED00}" type="datetimeFigureOut">
               <a:rPr lang="en-GB" smtClean="0"/>
-              <a:t>31/12/2019</a:t>
+              <a:t>01/02/2020</a:t>
             </a:fld>
             <a:endParaRPr lang="en-GB"/>
           </a:p>
@@ -5173,7 +5188,7 @@
           <a:p>
             <a:fld id="{C3BA7A23-F483-4D48-93AE-994D00473EAF}" type="slidenum">
               <a:rPr lang="en-GB" smtClean="0"/>
-              <a:t>‹N°›</a:t>
+              <a:t>‹#›</a:t>
             </a:fld>
             <a:endParaRPr lang="en-GB"/>
           </a:p>
@@ -5560,7 +5575,7 @@
           <a:p>
             <a:fld id="{44332F1C-FDE6-4B22-BAB3-7B6D3DF3ED00}" type="datetimeFigureOut">
               <a:rPr lang="en-GB" smtClean="0"/>
-              <a:t>31/12/2019</a:t>
+              <a:t>01/02/2020</a:t>
             </a:fld>
             <a:endParaRPr lang="en-GB"/>
           </a:p>
@@ -5639,7 +5654,7 @@
           <a:p>
             <a:fld id="{C3BA7A23-F483-4D48-93AE-994D00473EAF}" type="slidenum">
               <a:rPr lang="en-GB" smtClean="0"/>
-              <a:t>‹N°›</a:t>
+              <a:t>‹#›</a:t>
             </a:fld>
             <a:endParaRPr lang="en-GB"/>
           </a:p>
@@ -6175,6 +6190,567 @@
 </p:sld>
 </file>
 
+<file path=ppt/slides/slide10.xml><?xml version="1.0" encoding="utf-8"?>
+<p:sld xmlns:a="http://schemas.openxmlformats.org/drawingml/2006/main" xmlns:r="http://schemas.openxmlformats.org/officeDocument/2006/relationships" xmlns:p="http://schemas.openxmlformats.org/presentationml/2006/main">
+  <p:cSld>
+    <p:spTree>
+      <p:nvGrpSpPr>
+        <p:cNvPr id="1" name=""/>
+        <p:cNvGrpSpPr/>
+        <p:nvPr/>
+      </p:nvGrpSpPr>
+      <p:grpSpPr>
+        <a:xfrm>
+          <a:off x="0" y="0"/>
+          <a:ext cx="0" cy="0"/>
+          <a:chOff x="0" y="0"/>
+          <a:chExt cx="0" cy="0"/>
+        </a:xfrm>
+      </p:grpSpPr>
+      <p:sp>
+        <p:nvSpPr>
+          <p:cNvPr id="2" name="Titre 1">
+            <a:extLst>
+              <a:ext uri="{FF2B5EF4-FFF2-40B4-BE49-F238E27FC236}">
+                <a16:creationId xmlns:a16="http://schemas.microsoft.com/office/drawing/2014/main" id="{D2E9FA0C-58F1-4A4B-9371-52EC28ECB8B6}"/>
+              </a:ext>
+            </a:extLst>
+          </p:cNvPr>
+          <p:cNvSpPr>
+            <a:spLocks noGrp="1"/>
+          </p:cNvSpPr>
+          <p:nvPr>
+            <p:ph type="title"/>
+          </p:nvPr>
+        </p:nvSpPr>
+        <p:spPr/>
+        <p:txBody>
+          <a:bodyPr/>
+          <a:lstStyle/>
+          <a:p>
+            <a:r>
+              <a:rPr lang="fr-FR" dirty="0" err="1"/>
+              <a:t>Dataset</a:t>
+            </a:r>
+            <a:r>
+              <a:rPr lang="fr-FR" dirty="0"/>
+              <a:t> - Traitement</a:t>
+            </a:r>
+            <a:endParaRPr lang="en-GB" dirty="0"/>
+          </a:p>
+        </p:txBody>
+      </p:sp>
+      <p:sp>
+        <p:nvSpPr>
+          <p:cNvPr id="3" name="Espace réservé du contenu 2">
+            <a:extLst>
+              <a:ext uri="{FF2B5EF4-FFF2-40B4-BE49-F238E27FC236}">
+                <a16:creationId xmlns:a16="http://schemas.microsoft.com/office/drawing/2014/main" id="{19C4E6CE-F32C-4233-9D57-776B4F4C27AA}"/>
+              </a:ext>
+            </a:extLst>
+          </p:cNvPr>
+          <p:cNvSpPr>
+            <a:spLocks noGrp="1"/>
+          </p:cNvSpPr>
+          <p:nvPr>
+            <p:ph idx="1"/>
+          </p:nvPr>
+        </p:nvSpPr>
+        <p:spPr>
+          <a:xfrm>
+            <a:off x="1104293" y="2052918"/>
+            <a:ext cx="8946541" cy="4195481"/>
+          </a:xfrm>
+        </p:spPr>
+        <p:txBody>
+          <a:bodyPr/>
+          <a:lstStyle/>
+          <a:p>
+            <a:pPr algn="just"/>
+            <a:r>
+              <a:rPr lang="fr-FR" dirty="0"/>
+              <a:t>On relève aussi l’activité, chaque activité est associée à un numéro relevée en 4hz dont on uniformise les résultats pour comme si c’était en 700hz.</a:t>
+            </a:r>
+          </a:p>
+        </p:txBody>
+      </p:sp>
+      <p:pic>
+        <p:nvPicPr>
+          <p:cNvPr id="5" name="Picture 4">
+            <a:extLst>
+              <a:ext uri="{FF2B5EF4-FFF2-40B4-BE49-F238E27FC236}">
+                <a16:creationId xmlns:a16="http://schemas.microsoft.com/office/drawing/2014/main" id="{0FAE7C47-3E02-43D5-A963-E8E9A8AF146E}"/>
+              </a:ext>
+            </a:extLst>
+          </p:cNvPr>
+          <p:cNvPicPr>
+            <a:picLocks noChangeAspect="1"/>
+          </p:cNvPicPr>
+          <p:nvPr/>
+        </p:nvPicPr>
+        <p:blipFill>
+          <a:blip r:embed="rId2"/>
+          <a:stretch>
+            <a:fillRect/>
+          </a:stretch>
+        </p:blipFill>
+        <p:spPr>
+          <a:xfrm>
+            <a:off x="3581400" y="3775709"/>
+            <a:ext cx="5029200" cy="2228850"/>
+          </a:xfrm>
+          <a:prstGeom prst="rect">
+            <a:avLst/>
+          </a:prstGeom>
+        </p:spPr>
+      </p:pic>
+    </p:spTree>
+    <p:extLst>
+      <p:ext uri="{BB962C8B-B14F-4D97-AF65-F5344CB8AC3E}">
+        <p14:creationId xmlns:p14="http://schemas.microsoft.com/office/powerpoint/2010/main" val="1850602164"/>
+      </p:ext>
+    </p:extLst>
+  </p:cSld>
+  <p:clrMapOvr>
+    <a:masterClrMapping/>
+  </p:clrMapOvr>
+</p:sld>
+</file>
+
+<file path=ppt/slides/slide11.xml><?xml version="1.0" encoding="utf-8"?>
+<p:sld xmlns:a="http://schemas.openxmlformats.org/drawingml/2006/main" xmlns:r="http://schemas.openxmlformats.org/officeDocument/2006/relationships" xmlns:p="http://schemas.openxmlformats.org/presentationml/2006/main">
+  <p:cSld>
+    <p:spTree>
+      <p:nvGrpSpPr>
+        <p:cNvPr id="1" name=""/>
+        <p:cNvGrpSpPr/>
+        <p:nvPr/>
+      </p:nvGrpSpPr>
+      <p:grpSpPr>
+        <a:xfrm>
+          <a:off x="0" y="0"/>
+          <a:ext cx="0" cy="0"/>
+          <a:chOff x="0" y="0"/>
+          <a:chExt cx="0" cy="0"/>
+        </a:xfrm>
+      </p:grpSpPr>
+      <p:sp>
+        <p:nvSpPr>
+          <p:cNvPr id="2" name="Titre 1">
+            <a:extLst>
+              <a:ext uri="{FF2B5EF4-FFF2-40B4-BE49-F238E27FC236}">
+                <a16:creationId xmlns:a16="http://schemas.microsoft.com/office/drawing/2014/main" id="{D2E9FA0C-58F1-4A4B-9371-52EC28ECB8B6}"/>
+              </a:ext>
+            </a:extLst>
+          </p:cNvPr>
+          <p:cNvSpPr>
+            <a:spLocks noGrp="1"/>
+          </p:cNvSpPr>
+          <p:nvPr>
+            <p:ph type="title"/>
+          </p:nvPr>
+        </p:nvSpPr>
+        <p:spPr/>
+        <p:txBody>
+          <a:bodyPr/>
+          <a:lstStyle/>
+          <a:p>
+            <a:r>
+              <a:rPr lang="fr-FR" dirty="0" err="1"/>
+              <a:t>Dataset</a:t>
+            </a:r>
+            <a:r>
+              <a:rPr lang="fr-FR" dirty="0"/>
+              <a:t> - Traitement</a:t>
+            </a:r>
+            <a:endParaRPr lang="en-GB" dirty="0"/>
+          </a:p>
+        </p:txBody>
+      </p:sp>
+      <p:sp>
+        <p:nvSpPr>
+          <p:cNvPr id="3" name="Espace réservé du contenu 2">
+            <a:extLst>
+              <a:ext uri="{FF2B5EF4-FFF2-40B4-BE49-F238E27FC236}">
+                <a16:creationId xmlns:a16="http://schemas.microsoft.com/office/drawing/2014/main" id="{19C4E6CE-F32C-4233-9D57-776B4F4C27AA}"/>
+              </a:ext>
+            </a:extLst>
+          </p:cNvPr>
+          <p:cNvSpPr>
+            <a:spLocks noGrp="1"/>
+          </p:cNvSpPr>
+          <p:nvPr>
+            <p:ph idx="1"/>
+          </p:nvPr>
+        </p:nvSpPr>
+        <p:spPr>
+          <a:xfrm>
+            <a:off x="1104293" y="2052918"/>
+            <a:ext cx="8946541" cy="4195481"/>
+          </a:xfrm>
+        </p:spPr>
+        <p:txBody>
+          <a:bodyPr/>
+          <a:lstStyle/>
+          <a:p>
+            <a:pPr algn="just"/>
+            <a:r>
+              <a:rPr lang="fr-FR" dirty="0"/>
+              <a:t>Enfin, une fois chacune des colonnes traitées, on peut réassembler le tout et générer notre </a:t>
+            </a:r>
+            <a:r>
+              <a:rPr lang="fr-FR" dirty="0" err="1"/>
+              <a:t>dataframe</a:t>
+            </a:r>
+            <a:r>
+              <a:rPr lang="fr-FR" dirty="0"/>
+              <a:t> avec pandas.</a:t>
+            </a:r>
+          </a:p>
+        </p:txBody>
+      </p:sp>
+      <p:pic>
+        <p:nvPicPr>
+          <p:cNvPr id="7" name="Picture 6">
+            <a:extLst>
+              <a:ext uri="{FF2B5EF4-FFF2-40B4-BE49-F238E27FC236}">
+                <a16:creationId xmlns:a16="http://schemas.microsoft.com/office/drawing/2014/main" id="{097392D8-C801-4D3D-AE5F-FCB5D8D07AC8}"/>
+              </a:ext>
+            </a:extLst>
+          </p:cNvPr>
+          <p:cNvPicPr>
+            <a:picLocks noChangeAspect="1"/>
+          </p:cNvPicPr>
+          <p:nvPr/>
+        </p:nvPicPr>
+        <p:blipFill>
+          <a:blip r:embed="rId2"/>
+          <a:stretch>
+            <a:fillRect/>
+          </a:stretch>
+        </p:blipFill>
+        <p:spPr>
+          <a:xfrm>
+            <a:off x="1104293" y="3286124"/>
+            <a:ext cx="4743450" cy="2962275"/>
+          </a:xfrm>
+          <a:prstGeom prst="rect">
+            <a:avLst/>
+          </a:prstGeom>
+        </p:spPr>
+      </p:pic>
+      <p:pic>
+        <p:nvPicPr>
+          <p:cNvPr id="8" name="Picture 7">
+            <a:extLst>
+              <a:ext uri="{FF2B5EF4-FFF2-40B4-BE49-F238E27FC236}">
+                <a16:creationId xmlns:a16="http://schemas.microsoft.com/office/drawing/2014/main" id="{9FAE47FC-4B00-4C34-9DB4-B62FF7841517}"/>
+              </a:ext>
+            </a:extLst>
+          </p:cNvPr>
+          <p:cNvPicPr>
+            <a:picLocks noChangeAspect="1"/>
+          </p:cNvPicPr>
+          <p:nvPr/>
+        </p:nvPicPr>
+        <p:blipFill>
+          <a:blip r:embed="rId3"/>
+          <a:stretch>
+            <a:fillRect/>
+          </a:stretch>
+        </p:blipFill>
+        <p:spPr>
+          <a:xfrm>
+            <a:off x="5913473" y="3286124"/>
+            <a:ext cx="4783739" cy="2962275"/>
+          </a:xfrm>
+          <a:prstGeom prst="rect">
+            <a:avLst/>
+          </a:prstGeom>
+        </p:spPr>
+      </p:pic>
+    </p:spTree>
+    <p:extLst>
+      <p:ext uri="{BB962C8B-B14F-4D97-AF65-F5344CB8AC3E}">
+        <p14:creationId xmlns:p14="http://schemas.microsoft.com/office/powerpoint/2010/main" val="3592717059"/>
+      </p:ext>
+    </p:extLst>
+  </p:cSld>
+  <p:clrMapOvr>
+    <a:masterClrMapping/>
+  </p:clrMapOvr>
+</p:sld>
+</file>
+
+<file path=ppt/slides/slide12.xml><?xml version="1.0" encoding="utf-8"?>
+<p:sld xmlns:a="http://schemas.openxmlformats.org/drawingml/2006/main" xmlns:r="http://schemas.openxmlformats.org/officeDocument/2006/relationships" xmlns:p="http://schemas.openxmlformats.org/presentationml/2006/main">
+  <p:cSld>
+    <p:spTree>
+      <p:nvGrpSpPr>
+        <p:cNvPr id="1" name=""/>
+        <p:cNvGrpSpPr/>
+        <p:nvPr/>
+      </p:nvGrpSpPr>
+      <p:grpSpPr>
+        <a:xfrm>
+          <a:off x="0" y="0"/>
+          <a:ext cx="0" cy="0"/>
+          <a:chOff x="0" y="0"/>
+          <a:chExt cx="0" cy="0"/>
+        </a:xfrm>
+      </p:grpSpPr>
+      <p:sp>
+        <p:nvSpPr>
+          <p:cNvPr id="2" name="Titre 1">
+            <a:extLst>
+              <a:ext uri="{FF2B5EF4-FFF2-40B4-BE49-F238E27FC236}">
+                <a16:creationId xmlns:a16="http://schemas.microsoft.com/office/drawing/2014/main" id="{D2E9FA0C-58F1-4A4B-9371-52EC28ECB8B6}"/>
+              </a:ext>
+            </a:extLst>
+          </p:cNvPr>
+          <p:cNvSpPr>
+            <a:spLocks noGrp="1"/>
+          </p:cNvSpPr>
+          <p:nvPr>
+            <p:ph type="title"/>
+          </p:nvPr>
+        </p:nvSpPr>
+        <p:spPr/>
+        <p:txBody>
+          <a:bodyPr/>
+          <a:lstStyle/>
+          <a:p>
+            <a:r>
+              <a:rPr lang="fr-FR" dirty="0" err="1"/>
+              <a:t>Dataset</a:t>
+            </a:r>
+            <a:r>
+              <a:rPr lang="fr-FR" dirty="0"/>
+              <a:t> - </a:t>
+            </a:r>
+            <a:r>
+              <a:rPr lang="fr-FR" dirty="0" err="1"/>
+              <a:t>Analyze</a:t>
+            </a:r>
+            <a:endParaRPr lang="en-GB" dirty="0"/>
+          </a:p>
+        </p:txBody>
+      </p:sp>
+      <p:sp>
+        <p:nvSpPr>
+          <p:cNvPr id="3" name="Espace réservé du contenu 2">
+            <a:extLst>
+              <a:ext uri="{FF2B5EF4-FFF2-40B4-BE49-F238E27FC236}">
+                <a16:creationId xmlns:a16="http://schemas.microsoft.com/office/drawing/2014/main" id="{19C4E6CE-F32C-4233-9D57-776B4F4C27AA}"/>
+              </a:ext>
+            </a:extLst>
+          </p:cNvPr>
+          <p:cNvSpPr>
+            <a:spLocks noGrp="1"/>
+          </p:cNvSpPr>
+          <p:nvPr>
+            <p:ph idx="1"/>
+          </p:nvPr>
+        </p:nvSpPr>
+        <p:spPr>
+          <a:xfrm>
+            <a:off x="1104293" y="2052918"/>
+            <a:ext cx="4260187" cy="4195481"/>
+          </a:xfrm>
+        </p:spPr>
+        <p:txBody>
+          <a:bodyPr/>
+          <a:lstStyle/>
+          <a:p>
+            <a:pPr algn="just"/>
+            <a:r>
+              <a:rPr lang="fr-FR" dirty="0"/>
+              <a:t>On peut maintenant afficher nos colonnes avec la fonction plot de pandas.</a:t>
+            </a:r>
+          </a:p>
+          <a:p>
+            <a:pPr algn="just"/>
+            <a:r>
+              <a:rPr lang="fr-FR" dirty="0"/>
+              <a:t>Par exemple, prenons le numéro de l’activité en fonction du temps</a:t>
+            </a:r>
+          </a:p>
+        </p:txBody>
+      </p:sp>
+      <p:pic>
+        <p:nvPicPr>
+          <p:cNvPr id="4" name="Picture 3">
+            <a:extLst>
+              <a:ext uri="{FF2B5EF4-FFF2-40B4-BE49-F238E27FC236}">
+                <a16:creationId xmlns:a16="http://schemas.microsoft.com/office/drawing/2014/main" id="{991A5DDE-EFEE-42D7-BE31-7EF68BA9D7A1}"/>
+              </a:ext>
+            </a:extLst>
+          </p:cNvPr>
+          <p:cNvPicPr>
+            <a:picLocks noChangeAspect="1"/>
+          </p:cNvPicPr>
+          <p:nvPr/>
+        </p:nvPicPr>
+        <p:blipFill>
+          <a:blip r:embed="rId2"/>
+          <a:stretch>
+            <a:fillRect/>
+          </a:stretch>
+        </p:blipFill>
+        <p:spPr>
+          <a:xfrm>
+            <a:off x="6096000" y="2033518"/>
+            <a:ext cx="4541520" cy="4268818"/>
+          </a:xfrm>
+          <a:prstGeom prst="rect">
+            <a:avLst/>
+          </a:prstGeom>
+        </p:spPr>
+      </p:pic>
+    </p:spTree>
+    <p:extLst>
+      <p:ext uri="{BB962C8B-B14F-4D97-AF65-F5344CB8AC3E}">
+        <p14:creationId xmlns:p14="http://schemas.microsoft.com/office/powerpoint/2010/main" val="3858960496"/>
+      </p:ext>
+    </p:extLst>
+  </p:cSld>
+  <p:clrMapOvr>
+    <a:masterClrMapping/>
+  </p:clrMapOvr>
+</p:sld>
+</file>
+
+<file path=ppt/slides/slide13.xml><?xml version="1.0" encoding="utf-8"?>
+<p:sld xmlns:a="http://schemas.openxmlformats.org/drawingml/2006/main" xmlns:r="http://schemas.openxmlformats.org/officeDocument/2006/relationships" xmlns:p="http://schemas.openxmlformats.org/presentationml/2006/main">
+  <p:cSld>
+    <p:spTree>
+      <p:nvGrpSpPr>
+        <p:cNvPr id="1" name=""/>
+        <p:cNvGrpSpPr/>
+        <p:nvPr/>
+      </p:nvGrpSpPr>
+      <p:grpSpPr>
+        <a:xfrm>
+          <a:off x="0" y="0"/>
+          <a:ext cx="0" cy="0"/>
+          <a:chOff x="0" y="0"/>
+          <a:chExt cx="0" cy="0"/>
+        </a:xfrm>
+      </p:grpSpPr>
+      <p:sp>
+        <p:nvSpPr>
+          <p:cNvPr id="2" name="Titre 1">
+            <a:extLst>
+              <a:ext uri="{FF2B5EF4-FFF2-40B4-BE49-F238E27FC236}">
+                <a16:creationId xmlns:a16="http://schemas.microsoft.com/office/drawing/2014/main" id="{D2E9FA0C-58F1-4A4B-9371-52EC28ECB8B6}"/>
+              </a:ext>
+            </a:extLst>
+          </p:cNvPr>
+          <p:cNvSpPr>
+            <a:spLocks noGrp="1"/>
+          </p:cNvSpPr>
+          <p:nvPr>
+            <p:ph type="title"/>
+          </p:nvPr>
+        </p:nvSpPr>
+        <p:spPr/>
+        <p:txBody>
+          <a:bodyPr/>
+          <a:lstStyle/>
+          <a:p>
+            <a:r>
+              <a:rPr lang="fr-FR" dirty="0" err="1"/>
+              <a:t>Dataset</a:t>
+            </a:r>
+            <a:r>
+              <a:rPr lang="fr-FR" dirty="0"/>
+              <a:t> - </a:t>
+            </a:r>
+            <a:r>
+              <a:rPr lang="fr-FR" dirty="0" err="1"/>
+              <a:t>Analyze</a:t>
+            </a:r>
+            <a:endParaRPr lang="en-GB" dirty="0"/>
+          </a:p>
+        </p:txBody>
+      </p:sp>
+      <p:sp>
+        <p:nvSpPr>
+          <p:cNvPr id="3" name="Espace réservé du contenu 2">
+            <a:extLst>
+              <a:ext uri="{FF2B5EF4-FFF2-40B4-BE49-F238E27FC236}">
+                <a16:creationId xmlns:a16="http://schemas.microsoft.com/office/drawing/2014/main" id="{19C4E6CE-F32C-4233-9D57-776B4F4C27AA}"/>
+              </a:ext>
+            </a:extLst>
+          </p:cNvPr>
+          <p:cNvSpPr>
+            <a:spLocks noGrp="1"/>
+          </p:cNvSpPr>
+          <p:nvPr>
+            <p:ph idx="1"/>
+          </p:nvPr>
+        </p:nvSpPr>
+        <p:spPr>
+          <a:xfrm>
+            <a:off x="1104293" y="2052918"/>
+            <a:ext cx="5220307" cy="4195481"/>
+          </a:xfrm>
+        </p:spPr>
+        <p:txBody>
+          <a:bodyPr/>
+          <a:lstStyle/>
+          <a:p>
+            <a:pPr algn="just"/>
+            <a:r>
+              <a:rPr lang="fr-FR" dirty="0"/>
+              <a:t>On peut également vérifier les valeurs de l’électrocardiogramme. La courbe ressemble à celle que ce genre d’appareil génère.</a:t>
+            </a:r>
+          </a:p>
+        </p:txBody>
+      </p:sp>
+      <p:pic>
+        <p:nvPicPr>
+          <p:cNvPr id="5" name="Picture 4">
+            <a:extLst>
+              <a:ext uri="{FF2B5EF4-FFF2-40B4-BE49-F238E27FC236}">
+                <a16:creationId xmlns:a16="http://schemas.microsoft.com/office/drawing/2014/main" id="{775DAFA6-4D7D-428F-B893-9DF51453F231}"/>
+              </a:ext>
+            </a:extLst>
+          </p:cNvPr>
+          <p:cNvPicPr>
+            <a:picLocks noChangeAspect="1"/>
+          </p:cNvPicPr>
+          <p:nvPr/>
+        </p:nvPicPr>
+        <p:blipFill>
+          <a:blip r:embed="rId2"/>
+          <a:stretch>
+            <a:fillRect/>
+          </a:stretch>
+        </p:blipFill>
+        <p:spPr>
+          <a:xfrm>
+            <a:off x="6547485" y="2052918"/>
+            <a:ext cx="4400550" cy="3867150"/>
+          </a:xfrm>
+          <a:prstGeom prst="rect">
+            <a:avLst/>
+          </a:prstGeom>
+        </p:spPr>
+      </p:pic>
+    </p:spTree>
+    <p:extLst>
+      <p:ext uri="{BB962C8B-B14F-4D97-AF65-F5344CB8AC3E}">
+        <p14:creationId xmlns:p14="http://schemas.microsoft.com/office/powerpoint/2010/main" val="2228963960"/>
+      </p:ext>
+    </p:extLst>
+  </p:cSld>
+  <p:clrMapOvr>
+    <a:masterClrMapping/>
+  </p:clrMapOvr>
+</p:sld>
+</file>
+
 <file path=ppt/slides/slide2.xml><?xml version="1.0" encoding="utf-8"?>
 <p:sld xmlns:a="http://schemas.openxmlformats.org/drawingml/2006/main" xmlns:r="http://schemas.openxmlformats.org/officeDocument/2006/relationships" xmlns:p="http://schemas.openxmlformats.org/presentationml/2006/main">
   <p:cSld>
@@ -6246,6 +6822,7 @@
           <a:bodyPr/>
           <a:lstStyle/>
           <a:p>
+            <a:pPr algn="just"/>
             <a:r>
               <a:rPr lang="fr-FR" dirty="0"/>
               <a:t>Le </a:t>
@@ -6260,13 +6837,14 @@
             </a:r>
           </a:p>
           <a:p>
+            <a:pPr algn="just"/>
             <a:r>
               <a:rPr lang="fr-FR" dirty="0"/>
               <a:t>Le rythme cardiaque de 15 volontaires a été relevé à l’aide de 2 outils : </a:t>
             </a:r>
           </a:p>
           <a:p>
-            <a:pPr lvl="1"/>
+            <a:pPr lvl="1" algn="just"/>
             <a:r>
               <a:rPr lang="fr-FR" dirty="0"/>
               <a:t>Un au poignet (</a:t>
@@ -6289,7 +6867,7 @@
             </a:r>
           </a:p>
           <a:p>
-            <a:pPr lvl="1"/>
+            <a:pPr lvl="1" algn="just"/>
             <a:r>
               <a:rPr lang="fr-FR" dirty="0"/>
               <a:t>Un au torse (</a:t>
@@ -6370,7 +6948,7 @@
             </a:r>
             <a:r>
               <a:rPr lang="fr-FR" dirty="0"/>
-              <a:t> -Problématique</a:t>
+              <a:t> - Problématique</a:t>
             </a:r>
             <a:endParaRPr lang="en-GB" dirty="0"/>
           </a:p>
@@ -6392,15 +6970,63 @@
             <p:ph idx="1"/>
           </p:nvPr>
         </p:nvSpPr>
-        <p:spPr/>
-        <p:txBody>
-          <a:bodyPr/>
-          <a:lstStyle/>
-          <a:p>
+        <p:spPr>
+          <a:xfrm>
+            <a:off x="1104293" y="2052918"/>
+            <a:ext cx="8946541" cy="4195481"/>
+          </a:xfrm>
+        </p:spPr>
+        <p:txBody>
+          <a:bodyPr/>
+          <a:lstStyle/>
+          <a:p>
+            <a:pPr algn="just"/>
             <a:r>
               <a:rPr lang="fr-FR" dirty="0"/>
-              <a:t>L’objectif </a:t>
-            </a:r>
+              <a:t>Les relevés ont été effectués sur des candidats lors de différentes activités physique : repos, monté d’escaliers, babyfoot, cyclisme, conduite de voiture, déjeuner, marche, travail au bureau.</a:t>
+            </a:r>
+          </a:p>
+          <a:p>
+            <a:pPr algn="just"/>
+            <a:r>
+              <a:rPr lang="fr-FR" dirty="0"/>
+              <a:t>L’objectif est de déterminer à partir des relevés, l’activité d’une personne.*</a:t>
+            </a:r>
+          </a:p>
+          <a:p>
+            <a:pPr algn="just"/>
+            <a:r>
+              <a:rPr lang="fr-FR" dirty="0"/>
+              <a:t>Chaque candidat correspond à un dossier dans le </a:t>
+            </a:r>
+            <a:r>
+              <a:rPr lang="fr-FR" dirty="0" err="1"/>
+              <a:t>dataset</a:t>
+            </a:r>
+            <a:r>
+              <a:rPr lang="fr-FR" dirty="0"/>
+              <a:t>. Dans chacun de ces dossier, le fichier le plus important est le fichier .</a:t>
+            </a:r>
+            <a:r>
+              <a:rPr lang="fr-FR" dirty="0" err="1"/>
+              <a:t>pkl</a:t>
+            </a:r>
+            <a:r>
+              <a:rPr lang="fr-FR" dirty="0"/>
+              <a:t>, il contient l’ensemble des informations regroupées et organisées.</a:t>
+            </a:r>
+          </a:p>
+          <a:p>
+            <a:pPr algn="just"/>
+            <a:r>
+              <a:rPr lang="fr-FR" dirty="0"/>
+              <a:t>On retrouve également des relevés de capteurs au format csv, cependant, on a déjà ces données dans le fichier .</a:t>
+            </a:r>
+            <a:r>
+              <a:rPr lang="fr-FR" dirty="0" err="1"/>
+              <a:t>pkl</a:t>
+            </a:r>
+            <a:endParaRPr lang="fr-FR" dirty="0"/>
           </a:p>
         </p:txBody>
       </p:sp>
@@ -6408,6 +7034,964 @@
     <p:extLst>
       <p:ext uri="{BB962C8B-B14F-4D97-AF65-F5344CB8AC3E}">
         <p14:creationId xmlns:p14="http://schemas.microsoft.com/office/powerpoint/2010/main" val="3468491597"/>
+      </p:ext>
+    </p:extLst>
+  </p:cSld>
+  <p:clrMapOvr>
+    <a:masterClrMapping/>
+  </p:clrMapOvr>
+</p:sld>
+</file>
+
+<file path=ppt/slides/slide4.xml><?xml version="1.0" encoding="utf-8"?>
+<p:sld xmlns:a="http://schemas.openxmlformats.org/drawingml/2006/main" xmlns:r="http://schemas.openxmlformats.org/officeDocument/2006/relationships" xmlns:p="http://schemas.openxmlformats.org/presentationml/2006/main">
+  <p:cSld>
+    <p:spTree>
+      <p:nvGrpSpPr>
+        <p:cNvPr id="1" name=""/>
+        <p:cNvGrpSpPr/>
+        <p:nvPr/>
+      </p:nvGrpSpPr>
+      <p:grpSpPr>
+        <a:xfrm>
+          <a:off x="0" y="0"/>
+          <a:ext cx="0" cy="0"/>
+          <a:chOff x="0" y="0"/>
+          <a:chExt cx="0" cy="0"/>
+        </a:xfrm>
+      </p:grpSpPr>
+      <p:sp>
+        <p:nvSpPr>
+          <p:cNvPr id="2" name="Titre 1">
+            <a:extLst>
+              <a:ext uri="{FF2B5EF4-FFF2-40B4-BE49-F238E27FC236}">
+                <a16:creationId xmlns:a16="http://schemas.microsoft.com/office/drawing/2014/main" id="{D2E9FA0C-58F1-4A4B-9371-52EC28ECB8B6}"/>
+              </a:ext>
+            </a:extLst>
+          </p:cNvPr>
+          <p:cNvSpPr>
+            <a:spLocks noGrp="1"/>
+          </p:cNvSpPr>
+          <p:nvPr>
+            <p:ph type="title"/>
+          </p:nvPr>
+        </p:nvSpPr>
+        <p:spPr/>
+        <p:txBody>
+          <a:bodyPr/>
+          <a:lstStyle/>
+          <a:p>
+            <a:r>
+              <a:rPr lang="fr-FR" dirty="0" err="1"/>
+              <a:t>Dataset</a:t>
+            </a:r>
+            <a:r>
+              <a:rPr lang="fr-FR" dirty="0"/>
+              <a:t> - Traitement</a:t>
+            </a:r>
+            <a:endParaRPr lang="en-GB" dirty="0"/>
+          </a:p>
+        </p:txBody>
+      </p:sp>
+      <p:sp>
+        <p:nvSpPr>
+          <p:cNvPr id="3" name="Espace réservé du contenu 2">
+            <a:extLst>
+              <a:ext uri="{FF2B5EF4-FFF2-40B4-BE49-F238E27FC236}">
+                <a16:creationId xmlns:a16="http://schemas.microsoft.com/office/drawing/2014/main" id="{19C4E6CE-F32C-4233-9D57-776B4F4C27AA}"/>
+              </a:ext>
+            </a:extLst>
+          </p:cNvPr>
+          <p:cNvSpPr>
+            <a:spLocks noGrp="1"/>
+          </p:cNvSpPr>
+          <p:nvPr>
+            <p:ph idx="1"/>
+          </p:nvPr>
+        </p:nvSpPr>
+        <p:spPr>
+          <a:xfrm>
+            <a:off x="875201" y="2085002"/>
+            <a:ext cx="8946541" cy="4195481"/>
+          </a:xfrm>
+        </p:spPr>
+        <p:txBody>
+          <a:bodyPr/>
+          <a:lstStyle/>
+          <a:p>
+            <a:pPr algn="just"/>
+            <a:r>
+              <a:rPr lang="fr-FR" dirty="0"/>
+              <a:t>On commence par ouvrir les fichiers .</a:t>
+            </a:r>
+            <a:r>
+              <a:rPr lang="fr-FR" dirty="0" err="1"/>
+              <a:t>pkl</a:t>
+            </a:r>
+            <a:r>
+              <a:rPr lang="fr-FR" dirty="0"/>
+              <a:t> avec la bibliothèque pandas qui contient directement une fonction pour le faire. Pandas permet ainsi d’organiser la donnée sous forme de </a:t>
+            </a:r>
+            <a:r>
+              <a:rPr lang="fr-FR" dirty="0" err="1"/>
+              <a:t>dataframe</a:t>
+            </a:r>
+            <a:r>
+              <a:rPr lang="fr-FR" dirty="0"/>
+              <a:t>.</a:t>
+            </a:r>
+          </a:p>
+        </p:txBody>
+      </p:sp>
+      <p:pic>
+        <p:nvPicPr>
+          <p:cNvPr id="5" name="Picture 4">
+            <a:extLst>
+              <a:ext uri="{FF2B5EF4-FFF2-40B4-BE49-F238E27FC236}">
+                <a16:creationId xmlns:a16="http://schemas.microsoft.com/office/drawing/2014/main" id="{FA1A0A4D-8DC8-4C9E-A3CC-73BCF8634537}"/>
+              </a:ext>
+            </a:extLst>
+          </p:cNvPr>
+          <p:cNvPicPr>
+            <a:picLocks noChangeAspect="1"/>
+          </p:cNvPicPr>
+          <p:nvPr/>
+        </p:nvPicPr>
+        <p:blipFill>
+          <a:blip r:embed="rId2"/>
+          <a:stretch>
+            <a:fillRect/>
+          </a:stretch>
+        </p:blipFill>
+        <p:spPr>
+          <a:xfrm>
+            <a:off x="875201" y="3429000"/>
+            <a:ext cx="5220799" cy="1912177"/>
+          </a:xfrm>
+          <a:prstGeom prst="rect">
+            <a:avLst/>
+          </a:prstGeom>
+        </p:spPr>
+      </p:pic>
+      <p:pic>
+        <p:nvPicPr>
+          <p:cNvPr id="6" name="Picture 5">
+            <a:extLst>
+              <a:ext uri="{FF2B5EF4-FFF2-40B4-BE49-F238E27FC236}">
+                <a16:creationId xmlns:a16="http://schemas.microsoft.com/office/drawing/2014/main" id="{7948ECC8-9294-447D-BE5E-46C3E8BF49C9}"/>
+              </a:ext>
+            </a:extLst>
+          </p:cNvPr>
+          <p:cNvPicPr>
+            <a:picLocks noChangeAspect="1"/>
+          </p:cNvPicPr>
+          <p:nvPr/>
+        </p:nvPicPr>
+        <p:blipFill>
+          <a:blip r:embed="rId3"/>
+          <a:stretch>
+            <a:fillRect/>
+          </a:stretch>
+        </p:blipFill>
+        <p:spPr>
+          <a:xfrm>
+            <a:off x="6090758" y="3428999"/>
+            <a:ext cx="5002506" cy="1912177"/>
+          </a:xfrm>
+          <a:prstGeom prst="rect">
+            <a:avLst/>
+          </a:prstGeom>
+        </p:spPr>
+      </p:pic>
+    </p:spTree>
+    <p:extLst>
+      <p:ext uri="{BB962C8B-B14F-4D97-AF65-F5344CB8AC3E}">
+        <p14:creationId xmlns:p14="http://schemas.microsoft.com/office/powerpoint/2010/main" val="1552926137"/>
+      </p:ext>
+    </p:extLst>
+  </p:cSld>
+  <p:clrMapOvr>
+    <a:masterClrMapping/>
+  </p:clrMapOvr>
+</p:sld>
+</file>
+
+<file path=ppt/slides/slide5.xml><?xml version="1.0" encoding="utf-8"?>
+<p:sld xmlns:a="http://schemas.openxmlformats.org/drawingml/2006/main" xmlns:r="http://schemas.openxmlformats.org/officeDocument/2006/relationships" xmlns:p="http://schemas.openxmlformats.org/presentationml/2006/main">
+  <p:cSld>
+    <p:spTree>
+      <p:nvGrpSpPr>
+        <p:cNvPr id="1" name=""/>
+        <p:cNvGrpSpPr/>
+        <p:nvPr/>
+      </p:nvGrpSpPr>
+      <p:grpSpPr>
+        <a:xfrm>
+          <a:off x="0" y="0"/>
+          <a:ext cx="0" cy="0"/>
+          <a:chOff x="0" y="0"/>
+          <a:chExt cx="0" cy="0"/>
+        </a:xfrm>
+      </p:grpSpPr>
+      <p:sp>
+        <p:nvSpPr>
+          <p:cNvPr id="2" name="Titre 1">
+            <a:extLst>
+              <a:ext uri="{FF2B5EF4-FFF2-40B4-BE49-F238E27FC236}">
+                <a16:creationId xmlns:a16="http://schemas.microsoft.com/office/drawing/2014/main" id="{D2E9FA0C-58F1-4A4B-9371-52EC28ECB8B6}"/>
+              </a:ext>
+            </a:extLst>
+          </p:cNvPr>
+          <p:cNvSpPr>
+            <a:spLocks noGrp="1"/>
+          </p:cNvSpPr>
+          <p:nvPr>
+            <p:ph type="title"/>
+          </p:nvPr>
+        </p:nvSpPr>
+        <p:spPr/>
+        <p:txBody>
+          <a:bodyPr/>
+          <a:lstStyle/>
+          <a:p>
+            <a:r>
+              <a:rPr lang="fr-FR" dirty="0" err="1"/>
+              <a:t>Dataset</a:t>
+            </a:r>
+            <a:r>
+              <a:rPr lang="fr-FR" dirty="0"/>
+              <a:t> - Traitement</a:t>
+            </a:r>
+            <a:endParaRPr lang="en-GB" dirty="0"/>
+          </a:p>
+        </p:txBody>
+      </p:sp>
+      <p:sp>
+        <p:nvSpPr>
+          <p:cNvPr id="3" name="Espace réservé du contenu 2">
+            <a:extLst>
+              <a:ext uri="{FF2B5EF4-FFF2-40B4-BE49-F238E27FC236}">
+                <a16:creationId xmlns:a16="http://schemas.microsoft.com/office/drawing/2014/main" id="{19C4E6CE-F32C-4233-9D57-776B4F4C27AA}"/>
+              </a:ext>
+            </a:extLst>
+          </p:cNvPr>
+          <p:cNvSpPr>
+            <a:spLocks noGrp="1"/>
+          </p:cNvSpPr>
+          <p:nvPr>
+            <p:ph idx="1"/>
+          </p:nvPr>
+        </p:nvSpPr>
+        <p:spPr>
+          <a:xfrm>
+            <a:off x="875201" y="2085002"/>
+            <a:ext cx="8946541" cy="4195481"/>
+          </a:xfrm>
+        </p:spPr>
+        <p:txBody>
+          <a:bodyPr/>
+          <a:lstStyle/>
+          <a:p>
+            <a:pPr algn="just"/>
+            <a:r>
+              <a:rPr lang="fr-FR" dirty="0"/>
+              <a:t>Puis une fois les fichiers </a:t>
+            </a:r>
+            <a:r>
+              <a:rPr lang="fr-FR" dirty="0" err="1"/>
+              <a:t>pkl</a:t>
+            </a:r>
+            <a:r>
+              <a:rPr lang="fr-FR" dirty="0"/>
+              <a:t> ouverts, on peut récupérer chaque donnée récupérée par chaque capteurs pour pouvoir l’uniformiser</a:t>
+            </a:r>
+          </a:p>
+        </p:txBody>
+      </p:sp>
+      <p:pic>
+        <p:nvPicPr>
+          <p:cNvPr id="4" name="Picture 3">
+            <a:extLst>
+              <a:ext uri="{FF2B5EF4-FFF2-40B4-BE49-F238E27FC236}">
+                <a16:creationId xmlns:a16="http://schemas.microsoft.com/office/drawing/2014/main" id="{C6CB4555-D0C9-4620-A74C-CA79928D43E5}"/>
+              </a:ext>
+            </a:extLst>
+          </p:cNvPr>
+          <p:cNvPicPr>
+            <a:picLocks noChangeAspect="1"/>
+          </p:cNvPicPr>
+          <p:nvPr/>
+        </p:nvPicPr>
+        <p:blipFill>
+          <a:blip r:embed="rId2"/>
+          <a:stretch>
+            <a:fillRect/>
+          </a:stretch>
+        </p:blipFill>
+        <p:spPr>
+          <a:xfrm>
+            <a:off x="3529012" y="3429000"/>
+            <a:ext cx="5133975" cy="2743200"/>
+          </a:xfrm>
+          <a:prstGeom prst="rect">
+            <a:avLst/>
+          </a:prstGeom>
+        </p:spPr>
+      </p:pic>
+    </p:spTree>
+    <p:extLst>
+      <p:ext uri="{BB962C8B-B14F-4D97-AF65-F5344CB8AC3E}">
+        <p14:creationId xmlns:p14="http://schemas.microsoft.com/office/powerpoint/2010/main" val="3683195871"/>
+      </p:ext>
+    </p:extLst>
+  </p:cSld>
+  <p:clrMapOvr>
+    <a:masterClrMapping/>
+  </p:clrMapOvr>
+</p:sld>
+</file>
+
+<file path=ppt/slides/slide6.xml><?xml version="1.0" encoding="utf-8"?>
+<p:sld xmlns:a="http://schemas.openxmlformats.org/drawingml/2006/main" xmlns:r="http://schemas.openxmlformats.org/officeDocument/2006/relationships" xmlns:p="http://schemas.openxmlformats.org/presentationml/2006/main">
+  <p:cSld>
+    <p:spTree>
+      <p:nvGrpSpPr>
+        <p:cNvPr id="1" name=""/>
+        <p:cNvGrpSpPr/>
+        <p:nvPr/>
+      </p:nvGrpSpPr>
+      <p:grpSpPr>
+        <a:xfrm>
+          <a:off x="0" y="0"/>
+          <a:ext cx="0" cy="0"/>
+          <a:chOff x="0" y="0"/>
+          <a:chExt cx="0" cy="0"/>
+        </a:xfrm>
+      </p:grpSpPr>
+      <p:sp>
+        <p:nvSpPr>
+          <p:cNvPr id="2" name="Titre 1">
+            <a:extLst>
+              <a:ext uri="{FF2B5EF4-FFF2-40B4-BE49-F238E27FC236}">
+                <a16:creationId xmlns:a16="http://schemas.microsoft.com/office/drawing/2014/main" id="{D2E9FA0C-58F1-4A4B-9371-52EC28ECB8B6}"/>
+              </a:ext>
+            </a:extLst>
+          </p:cNvPr>
+          <p:cNvSpPr>
+            <a:spLocks noGrp="1"/>
+          </p:cNvSpPr>
+          <p:nvPr>
+            <p:ph type="title"/>
+          </p:nvPr>
+        </p:nvSpPr>
+        <p:spPr/>
+        <p:txBody>
+          <a:bodyPr/>
+          <a:lstStyle/>
+          <a:p>
+            <a:r>
+              <a:rPr lang="fr-FR" dirty="0" err="1"/>
+              <a:t>Dataset</a:t>
+            </a:r>
+            <a:r>
+              <a:rPr lang="fr-FR" dirty="0"/>
+              <a:t> - Traitement</a:t>
+            </a:r>
+            <a:endParaRPr lang="en-GB" dirty="0"/>
+          </a:p>
+        </p:txBody>
+      </p:sp>
+      <p:sp>
+        <p:nvSpPr>
+          <p:cNvPr id="3" name="Espace réservé du contenu 2">
+            <a:extLst>
+              <a:ext uri="{FF2B5EF4-FFF2-40B4-BE49-F238E27FC236}">
+                <a16:creationId xmlns:a16="http://schemas.microsoft.com/office/drawing/2014/main" id="{19C4E6CE-F32C-4233-9D57-776B4F4C27AA}"/>
+              </a:ext>
+            </a:extLst>
+          </p:cNvPr>
+          <p:cNvSpPr>
+            <a:spLocks noGrp="1"/>
+          </p:cNvSpPr>
+          <p:nvPr>
+            <p:ph idx="1"/>
+          </p:nvPr>
+        </p:nvSpPr>
+        <p:spPr>
+          <a:xfrm>
+            <a:off x="1104293" y="2052918"/>
+            <a:ext cx="8946541" cy="4195481"/>
+          </a:xfrm>
+        </p:spPr>
+        <p:txBody>
+          <a:bodyPr/>
+          <a:lstStyle/>
+          <a:p>
+            <a:pPr algn="just"/>
+            <a:r>
+              <a:rPr lang="fr-FR" dirty="0"/>
+              <a:t>Les capteurs ont fréquences de relevé différentes. Il est donc nécessaire d’uniformiser la longueur des colonnes pour chaque donnée captée. Nous avons les fréquences suivantes : 700hz, 64hz, 32hz et 4hz. Il faut caler l’ensemble des données sur la plus grande fréquence, 700hz, car c’est celle qui relève le plus de valeur sur la période de temps totale.</a:t>
+            </a:r>
+          </a:p>
+          <a:p>
+            <a:pPr algn="just"/>
+            <a:endParaRPr lang="fr-FR" dirty="0"/>
+          </a:p>
+        </p:txBody>
+      </p:sp>
+      <p:pic>
+        <p:nvPicPr>
+          <p:cNvPr id="5" name="Picture 4">
+            <a:extLst>
+              <a:ext uri="{FF2B5EF4-FFF2-40B4-BE49-F238E27FC236}">
+                <a16:creationId xmlns:a16="http://schemas.microsoft.com/office/drawing/2014/main" id="{23C72110-3A57-4110-88E9-CED4BD20EEF6}"/>
+              </a:ext>
+            </a:extLst>
+          </p:cNvPr>
+          <p:cNvPicPr>
+            <a:picLocks noChangeAspect="1"/>
+          </p:cNvPicPr>
+          <p:nvPr/>
+        </p:nvPicPr>
+        <p:blipFill>
+          <a:blip r:embed="rId2"/>
+          <a:stretch>
+            <a:fillRect/>
+          </a:stretch>
+        </p:blipFill>
+        <p:spPr>
+          <a:xfrm>
+            <a:off x="2936617" y="4150658"/>
+            <a:ext cx="6318766" cy="2097741"/>
+          </a:xfrm>
+          <a:prstGeom prst="rect">
+            <a:avLst/>
+          </a:prstGeom>
+        </p:spPr>
+      </p:pic>
+    </p:spTree>
+    <p:extLst>
+      <p:ext uri="{BB962C8B-B14F-4D97-AF65-F5344CB8AC3E}">
+        <p14:creationId xmlns:p14="http://schemas.microsoft.com/office/powerpoint/2010/main" val="63232388"/>
+      </p:ext>
+    </p:extLst>
+  </p:cSld>
+  <p:clrMapOvr>
+    <a:masterClrMapping/>
+  </p:clrMapOvr>
+</p:sld>
+</file>
+
+<file path=ppt/slides/slide7.xml><?xml version="1.0" encoding="utf-8"?>
+<p:sld xmlns:a="http://schemas.openxmlformats.org/drawingml/2006/main" xmlns:r="http://schemas.openxmlformats.org/officeDocument/2006/relationships" xmlns:p="http://schemas.openxmlformats.org/presentationml/2006/main">
+  <p:cSld>
+    <p:spTree>
+      <p:nvGrpSpPr>
+        <p:cNvPr id="1" name=""/>
+        <p:cNvGrpSpPr/>
+        <p:nvPr/>
+      </p:nvGrpSpPr>
+      <p:grpSpPr>
+        <a:xfrm>
+          <a:off x="0" y="0"/>
+          <a:ext cx="0" cy="0"/>
+          <a:chOff x="0" y="0"/>
+          <a:chExt cx="0" cy="0"/>
+        </a:xfrm>
+      </p:grpSpPr>
+      <p:sp>
+        <p:nvSpPr>
+          <p:cNvPr id="2" name="Titre 1">
+            <a:extLst>
+              <a:ext uri="{FF2B5EF4-FFF2-40B4-BE49-F238E27FC236}">
+                <a16:creationId xmlns:a16="http://schemas.microsoft.com/office/drawing/2014/main" id="{D2E9FA0C-58F1-4A4B-9371-52EC28ECB8B6}"/>
+              </a:ext>
+            </a:extLst>
+          </p:cNvPr>
+          <p:cNvSpPr>
+            <a:spLocks noGrp="1"/>
+          </p:cNvSpPr>
+          <p:nvPr>
+            <p:ph type="title"/>
+          </p:nvPr>
+        </p:nvSpPr>
+        <p:spPr/>
+        <p:txBody>
+          <a:bodyPr/>
+          <a:lstStyle/>
+          <a:p>
+            <a:r>
+              <a:rPr lang="fr-FR" dirty="0" err="1"/>
+              <a:t>Dataset</a:t>
+            </a:r>
+            <a:r>
+              <a:rPr lang="fr-FR" dirty="0"/>
+              <a:t> - Traitement</a:t>
+            </a:r>
+            <a:endParaRPr lang="en-GB" dirty="0"/>
+          </a:p>
+        </p:txBody>
+      </p:sp>
+      <p:sp>
+        <p:nvSpPr>
+          <p:cNvPr id="3" name="Espace réservé du contenu 2">
+            <a:extLst>
+              <a:ext uri="{FF2B5EF4-FFF2-40B4-BE49-F238E27FC236}">
+                <a16:creationId xmlns:a16="http://schemas.microsoft.com/office/drawing/2014/main" id="{19C4E6CE-F32C-4233-9D57-776B4F4C27AA}"/>
+              </a:ext>
+            </a:extLst>
+          </p:cNvPr>
+          <p:cNvSpPr>
+            <a:spLocks noGrp="1"/>
+          </p:cNvSpPr>
+          <p:nvPr>
+            <p:ph idx="1"/>
+          </p:nvPr>
+        </p:nvSpPr>
+        <p:spPr>
+          <a:xfrm>
+            <a:off x="1104293" y="2052918"/>
+            <a:ext cx="8946541" cy="4195481"/>
+          </a:xfrm>
+        </p:spPr>
+        <p:txBody>
+          <a:bodyPr/>
+          <a:lstStyle/>
+          <a:p>
+            <a:pPr algn="just"/>
+            <a:r>
+              <a:rPr lang="fr-FR" dirty="0"/>
+              <a:t>Il faut que chaque colonne ne possède qu’une seule valeur, or les accéléromètres relèvent des vecteurs [</a:t>
+            </a:r>
+            <a:r>
+              <a:rPr lang="fr-FR" dirty="0" err="1"/>
+              <a:t>x,y,z</a:t>
+            </a:r>
+            <a:r>
+              <a:rPr lang="fr-FR" dirty="0"/>
+              <a:t>]. Ainsi je crée une liste pour chacun des axes, et ce pour les deux capteurs (</a:t>
+            </a:r>
+            <a:r>
+              <a:rPr lang="fr-FR" dirty="0" err="1"/>
+              <a:t>Empatica</a:t>
+            </a:r>
+            <a:r>
+              <a:rPr lang="fr-FR" dirty="0"/>
+              <a:t> E4 et </a:t>
+            </a:r>
+            <a:r>
+              <a:rPr lang="fr-FR" dirty="0" err="1"/>
+              <a:t>RespiBAN</a:t>
+            </a:r>
+            <a:r>
+              <a:rPr lang="fr-FR" dirty="0"/>
+              <a:t>).</a:t>
+            </a:r>
+          </a:p>
+        </p:txBody>
+      </p:sp>
+      <p:pic>
+        <p:nvPicPr>
+          <p:cNvPr id="4" name="Picture 3">
+            <a:extLst>
+              <a:ext uri="{FF2B5EF4-FFF2-40B4-BE49-F238E27FC236}">
+                <a16:creationId xmlns:a16="http://schemas.microsoft.com/office/drawing/2014/main" id="{C3A94F8F-6A59-4D0B-AD53-2AD6A40F1F61}"/>
+              </a:ext>
+            </a:extLst>
+          </p:cNvPr>
+          <p:cNvPicPr>
+            <a:picLocks noChangeAspect="1"/>
+          </p:cNvPicPr>
+          <p:nvPr/>
+        </p:nvPicPr>
+        <p:blipFill>
+          <a:blip r:embed="rId2"/>
+          <a:stretch>
+            <a:fillRect/>
+          </a:stretch>
+        </p:blipFill>
+        <p:spPr>
+          <a:xfrm>
+            <a:off x="1625346" y="4150658"/>
+            <a:ext cx="4019550" cy="1200150"/>
+          </a:xfrm>
+          <a:prstGeom prst="rect">
+            <a:avLst/>
+          </a:prstGeom>
+        </p:spPr>
+      </p:pic>
+      <p:pic>
+        <p:nvPicPr>
+          <p:cNvPr id="5" name="Picture 4">
+            <a:extLst>
+              <a:ext uri="{FF2B5EF4-FFF2-40B4-BE49-F238E27FC236}">
+                <a16:creationId xmlns:a16="http://schemas.microsoft.com/office/drawing/2014/main" id="{E2A0B2C2-C1E8-468A-9833-ACD86EFFB6CC}"/>
+              </a:ext>
+            </a:extLst>
+          </p:cNvPr>
+          <p:cNvPicPr>
+            <a:picLocks noChangeAspect="1"/>
+          </p:cNvPicPr>
+          <p:nvPr/>
+        </p:nvPicPr>
+        <p:blipFill>
+          <a:blip r:embed="rId3"/>
+          <a:stretch>
+            <a:fillRect/>
+          </a:stretch>
+        </p:blipFill>
+        <p:spPr>
+          <a:xfrm>
+            <a:off x="5980390" y="4150658"/>
+            <a:ext cx="3734950" cy="1200150"/>
+          </a:xfrm>
+          <a:prstGeom prst="rect">
+            <a:avLst/>
+          </a:prstGeom>
+        </p:spPr>
+      </p:pic>
+    </p:spTree>
+    <p:extLst>
+      <p:ext uri="{BB962C8B-B14F-4D97-AF65-F5344CB8AC3E}">
+        <p14:creationId xmlns:p14="http://schemas.microsoft.com/office/powerpoint/2010/main" val="140895463"/>
+      </p:ext>
+    </p:extLst>
+  </p:cSld>
+  <p:clrMapOvr>
+    <a:masterClrMapping/>
+  </p:clrMapOvr>
+</p:sld>
+</file>
+
+<file path=ppt/slides/slide8.xml><?xml version="1.0" encoding="utf-8"?>
+<p:sld xmlns:a="http://schemas.openxmlformats.org/drawingml/2006/main" xmlns:r="http://schemas.openxmlformats.org/officeDocument/2006/relationships" xmlns:p="http://schemas.openxmlformats.org/presentationml/2006/main">
+  <p:cSld>
+    <p:spTree>
+      <p:nvGrpSpPr>
+        <p:cNvPr id="1" name=""/>
+        <p:cNvGrpSpPr/>
+        <p:nvPr/>
+      </p:nvGrpSpPr>
+      <p:grpSpPr>
+        <a:xfrm>
+          <a:off x="0" y="0"/>
+          <a:ext cx="0" cy="0"/>
+          <a:chOff x="0" y="0"/>
+          <a:chExt cx="0" cy="0"/>
+        </a:xfrm>
+      </p:grpSpPr>
+      <p:sp>
+        <p:nvSpPr>
+          <p:cNvPr id="2" name="Titre 1">
+            <a:extLst>
+              <a:ext uri="{FF2B5EF4-FFF2-40B4-BE49-F238E27FC236}">
+                <a16:creationId xmlns:a16="http://schemas.microsoft.com/office/drawing/2014/main" id="{D2E9FA0C-58F1-4A4B-9371-52EC28ECB8B6}"/>
+              </a:ext>
+            </a:extLst>
+          </p:cNvPr>
+          <p:cNvSpPr>
+            <a:spLocks noGrp="1"/>
+          </p:cNvSpPr>
+          <p:nvPr>
+            <p:ph type="title"/>
+          </p:nvPr>
+        </p:nvSpPr>
+        <p:spPr/>
+        <p:txBody>
+          <a:bodyPr/>
+          <a:lstStyle/>
+          <a:p>
+            <a:r>
+              <a:rPr lang="fr-FR" dirty="0" err="1"/>
+              <a:t>Dataset</a:t>
+            </a:r>
+            <a:r>
+              <a:rPr lang="fr-FR" dirty="0"/>
+              <a:t> - Traitement</a:t>
+            </a:r>
+            <a:endParaRPr lang="en-GB" dirty="0"/>
+          </a:p>
+        </p:txBody>
+      </p:sp>
+      <p:sp>
+        <p:nvSpPr>
+          <p:cNvPr id="3" name="Espace réservé du contenu 2">
+            <a:extLst>
+              <a:ext uri="{FF2B5EF4-FFF2-40B4-BE49-F238E27FC236}">
+                <a16:creationId xmlns:a16="http://schemas.microsoft.com/office/drawing/2014/main" id="{19C4E6CE-F32C-4233-9D57-776B4F4C27AA}"/>
+              </a:ext>
+            </a:extLst>
+          </p:cNvPr>
+          <p:cNvSpPr>
+            <a:spLocks noGrp="1"/>
+          </p:cNvSpPr>
+          <p:nvPr>
+            <p:ph idx="1"/>
+          </p:nvPr>
+        </p:nvSpPr>
+        <p:spPr>
+          <a:xfrm>
+            <a:off x="1104293" y="2052918"/>
+            <a:ext cx="8946541" cy="4195481"/>
+          </a:xfrm>
+        </p:spPr>
+        <p:txBody>
+          <a:bodyPr/>
+          <a:lstStyle/>
+          <a:p>
+            <a:pPr algn="just"/>
+            <a:r>
+              <a:rPr lang="fr-FR" dirty="0"/>
+              <a:t>On a également des informations sur la personne qui ne sont pas liées au relevés par les capteurs : </a:t>
+            </a:r>
+            <a:r>
+              <a:rPr lang="fr-FR" dirty="0" err="1"/>
+              <a:t>l’age</a:t>
+            </a:r>
+            <a:r>
+              <a:rPr lang="fr-FR" dirty="0"/>
+              <a:t>, le genre, la taille, le poids, le type de peau, et si la personne est sportive ou non. J’ai également remplacé le genre par un chiffre, (0 = homme, 1 = femme), afin de pouvoir traiter cela plus facilement pour la suite)</a:t>
+            </a:r>
+          </a:p>
+          <a:p>
+            <a:pPr algn="just"/>
+            <a:endParaRPr lang="fr-FR" dirty="0"/>
+          </a:p>
+        </p:txBody>
+      </p:sp>
+      <p:pic>
+        <p:nvPicPr>
+          <p:cNvPr id="5" name="Picture 4">
+            <a:extLst>
+              <a:ext uri="{FF2B5EF4-FFF2-40B4-BE49-F238E27FC236}">
+                <a16:creationId xmlns:a16="http://schemas.microsoft.com/office/drawing/2014/main" id="{4D7D4B21-8E60-426A-8EE5-01A5E4954C95}"/>
+              </a:ext>
+            </a:extLst>
+          </p:cNvPr>
+          <p:cNvPicPr>
+            <a:picLocks noChangeAspect="1"/>
+          </p:cNvPicPr>
+          <p:nvPr/>
+        </p:nvPicPr>
+        <p:blipFill>
+          <a:blip r:embed="rId2"/>
+          <a:stretch>
+            <a:fillRect/>
+          </a:stretch>
+        </p:blipFill>
+        <p:spPr>
+          <a:xfrm>
+            <a:off x="1558013" y="3895724"/>
+            <a:ext cx="4019550" cy="2352675"/>
+          </a:xfrm>
+          <a:prstGeom prst="rect">
+            <a:avLst/>
+          </a:prstGeom>
+        </p:spPr>
+      </p:pic>
+      <p:pic>
+        <p:nvPicPr>
+          <p:cNvPr id="6" name="Picture 5">
+            <a:extLst>
+              <a:ext uri="{FF2B5EF4-FFF2-40B4-BE49-F238E27FC236}">
+                <a16:creationId xmlns:a16="http://schemas.microsoft.com/office/drawing/2014/main" id="{3F276031-6AF2-4AEE-8CE7-73B39A09DA89}"/>
+              </a:ext>
+            </a:extLst>
+          </p:cNvPr>
+          <p:cNvPicPr>
+            <a:picLocks noChangeAspect="1"/>
+          </p:cNvPicPr>
+          <p:nvPr/>
+        </p:nvPicPr>
+        <p:blipFill>
+          <a:blip r:embed="rId3"/>
+          <a:stretch>
+            <a:fillRect/>
+          </a:stretch>
+        </p:blipFill>
+        <p:spPr>
+          <a:xfrm>
+            <a:off x="6096000" y="4233861"/>
+            <a:ext cx="3762375" cy="1676400"/>
+          </a:xfrm>
+          <a:prstGeom prst="rect">
+            <a:avLst/>
+          </a:prstGeom>
+        </p:spPr>
+      </p:pic>
+    </p:spTree>
+    <p:extLst>
+      <p:ext uri="{BB962C8B-B14F-4D97-AF65-F5344CB8AC3E}">
+        <p14:creationId xmlns:p14="http://schemas.microsoft.com/office/powerpoint/2010/main" val="2888735742"/>
+      </p:ext>
+    </p:extLst>
+  </p:cSld>
+  <p:clrMapOvr>
+    <a:masterClrMapping/>
+  </p:clrMapOvr>
+</p:sld>
+</file>
+
+<file path=ppt/slides/slide9.xml><?xml version="1.0" encoding="utf-8"?>
+<p:sld xmlns:a="http://schemas.openxmlformats.org/drawingml/2006/main" xmlns:r="http://schemas.openxmlformats.org/officeDocument/2006/relationships" xmlns:p="http://schemas.openxmlformats.org/presentationml/2006/main">
+  <p:cSld>
+    <p:spTree>
+      <p:nvGrpSpPr>
+        <p:cNvPr id="1" name=""/>
+        <p:cNvGrpSpPr/>
+        <p:nvPr/>
+      </p:nvGrpSpPr>
+      <p:grpSpPr>
+        <a:xfrm>
+          <a:off x="0" y="0"/>
+          <a:ext cx="0" cy="0"/>
+          <a:chOff x="0" y="0"/>
+          <a:chExt cx="0" cy="0"/>
+        </a:xfrm>
+      </p:grpSpPr>
+      <p:sp>
+        <p:nvSpPr>
+          <p:cNvPr id="2" name="Titre 1">
+            <a:extLst>
+              <a:ext uri="{FF2B5EF4-FFF2-40B4-BE49-F238E27FC236}">
+                <a16:creationId xmlns:a16="http://schemas.microsoft.com/office/drawing/2014/main" id="{D2E9FA0C-58F1-4A4B-9371-52EC28ECB8B6}"/>
+              </a:ext>
+            </a:extLst>
+          </p:cNvPr>
+          <p:cNvSpPr>
+            <a:spLocks noGrp="1"/>
+          </p:cNvSpPr>
+          <p:nvPr>
+            <p:ph type="title"/>
+          </p:nvPr>
+        </p:nvSpPr>
+        <p:spPr/>
+        <p:txBody>
+          <a:bodyPr/>
+          <a:lstStyle/>
+          <a:p>
+            <a:r>
+              <a:rPr lang="fr-FR" dirty="0" err="1"/>
+              <a:t>Dataset</a:t>
+            </a:r>
+            <a:r>
+              <a:rPr lang="fr-FR" dirty="0"/>
+              <a:t> - Traitement</a:t>
+            </a:r>
+            <a:endParaRPr lang="en-GB" dirty="0"/>
+          </a:p>
+        </p:txBody>
+      </p:sp>
+      <p:sp>
+        <p:nvSpPr>
+          <p:cNvPr id="3" name="Espace réservé du contenu 2">
+            <a:extLst>
+              <a:ext uri="{FF2B5EF4-FFF2-40B4-BE49-F238E27FC236}">
+                <a16:creationId xmlns:a16="http://schemas.microsoft.com/office/drawing/2014/main" id="{19C4E6CE-F32C-4233-9D57-776B4F4C27AA}"/>
+              </a:ext>
+            </a:extLst>
+          </p:cNvPr>
+          <p:cNvSpPr>
+            <a:spLocks noGrp="1"/>
+          </p:cNvSpPr>
+          <p:nvPr>
+            <p:ph idx="1"/>
+          </p:nvPr>
+        </p:nvSpPr>
+        <p:spPr>
+          <a:xfrm>
+            <a:off x="1104293" y="2052918"/>
+            <a:ext cx="8946541" cy="4195481"/>
+          </a:xfrm>
+        </p:spPr>
+        <p:txBody>
+          <a:bodyPr/>
+          <a:lstStyle/>
+          <a:p>
+            <a:pPr algn="just"/>
+            <a:r>
+              <a:rPr lang="fr-FR" dirty="0"/>
+              <a:t>Le problème est qu’il n’y a qu’une seule valeur pour ces paramètres propres à la personne en question. Pour l’insérer dans le </a:t>
+            </a:r>
+            <a:r>
+              <a:rPr lang="fr-FR" dirty="0" err="1"/>
+              <a:t>dataframe</a:t>
+            </a:r>
+            <a:r>
+              <a:rPr lang="fr-FR" dirty="0"/>
+              <a:t>, j’ai donc créé des listes de la bonne longueur avec la valeur qui est répétée.</a:t>
+            </a:r>
+          </a:p>
+          <a:p>
+            <a:pPr algn="just"/>
+            <a:endParaRPr lang="fr-FR" dirty="0"/>
+          </a:p>
+        </p:txBody>
+      </p:sp>
+      <p:pic>
+        <p:nvPicPr>
+          <p:cNvPr id="4" name="Picture 3">
+            <a:extLst>
+              <a:ext uri="{FF2B5EF4-FFF2-40B4-BE49-F238E27FC236}">
+                <a16:creationId xmlns:a16="http://schemas.microsoft.com/office/drawing/2014/main" id="{2CDEEE8A-B4A0-4281-A34C-C1953F12C3AE}"/>
+              </a:ext>
+            </a:extLst>
+          </p:cNvPr>
+          <p:cNvPicPr>
+            <a:picLocks noChangeAspect="1"/>
+          </p:cNvPicPr>
+          <p:nvPr/>
+        </p:nvPicPr>
+        <p:blipFill>
+          <a:blip r:embed="rId2"/>
+          <a:stretch>
+            <a:fillRect/>
+          </a:stretch>
+        </p:blipFill>
+        <p:spPr>
+          <a:xfrm>
+            <a:off x="5907741" y="4150658"/>
+            <a:ext cx="4505325" cy="1714500"/>
+          </a:xfrm>
+          <a:prstGeom prst="rect">
+            <a:avLst/>
+          </a:prstGeom>
+        </p:spPr>
+      </p:pic>
+      <p:pic>
+        <p:nvPicPr>
+          <p:cNvPr id="6" name="Picture 5">
+            <a:extLst>
+              <a:ext uri="{FF2B5EF4-FFF2-40B4-BE49-F238E27FC236}">
+                <a16:creationId xmlns:a16="http://schemas.microsoft.com/office/drawing/2014/main" id="{DAE23496-976B-4310-A55B-DD39D6D86A33}"/>
+              </a:ext>
+            </a:extLst>
+          </p:cNvPr>
+          <p:cNvPicPr>
+            <a:picLocks noChangeAspect="1"/>
+          </p:cNvPicPr>
+          <p:nvPr/>
+        </p:nvPicPr>
+        <p:blipFill>
+          <a:blip r:embed="rId3"/>
+          <a:stretch>
+            <a:fillRect/>
+          </a:stretch>
+        </p:blipFill>
+        <p:spPr>
+          <a:xfrm>
+            <a:off x="1850432" y="4150658"/>
+            <a:ext cx="3498040" cy="1714500"/>
+          </a:xfrm>
+          <a:prstGeom prst="rect">
+            <a:avLst/>
+          </a:prstGeom>
+        </p:spPr>
+      </p:pic>
+    </p:spTree>
+    <p:extLst>
+      <p:ext uri="{BB962C8B-B14F-4D97-AF65-F5344CB8AC3E}">
+        <p14:creationId xmlns:p14="http://schemas.microsoft.com/office/powerpoint/2010/main" val="1076366795"/>
       </p:ext>
     </p:extLst>
   </p:cSld>

</xml_diff>